<commit_message>
add replies to reviewer 1
</commit_message>
<xml_diff>
--- a/inst/documentation/DODO-F1000-publication/fig/dodo_ba_fa.pptx
+++ b/inst/documentation/DODO-F1000-publication/fig/dodo_ba_fa.pptx
@@ -115,7 +115,7 @@
 <file path=ppt/revisionInfo.xml><?xml version="1.0" encoding="utf-8"?>
 <p1510:revInfo xmlns:a="http://schemas.openxmlformats.org/drawingml/2006/main" xmlns:r="http://schemas.openxmlformats.org/officeDocument/2006/relationships" xmlns:p1510="http://schemas.microsoft.com/office/powerpoint/2015/10/main">
   <p1510:revLst>
-    <p1510:client id="{D52F279A-7EF8-4C78-9FE3-07C474CD763D}" v="199" dt="2020-06-02T14:52:18.846"/>
+    <p1510:client id="{4ABBA479-A061-440C-B629-7F3B53190977}" v="52" dt="2020-12-17T14:11:04.459"/>
   </p1510:revLst>
 </p1510:revInfo>
 </file>
@@ -123,196 +123,28 @@
 <file path=ppt/changesInfos/changesInfo1.xml><?xml version="1.0" encoding="utf-8"?>
 <pc:chgInfo xmlns:a="http://schemas.openxmlformats.org/drawingml/2006/main" xmlns:r="http://schemas.openxmlformats.org/officeDocument/2006/relationships" xmlns:ac="http://schemas.microsoft.com/office/drawing/2013/main/command" xmlns:pc="http://schemas.microsoft.com/office/powerpoint/2013/main/command">
   <pc:docChgLst>
-    <pc:chgData name="François Liesbeth" userId="3ca9ba9f-ce0c-4547-bb8e-099dd0b0678a" providerId="ADAL" clId="{D52F279A-7EF8-4C78-9FE3-07C474CD763D}"/>
-    <pc:docChg chg="undo custSel modSld">
-      <pc:chgData name="François Liesbeth" userId="3ca9ba9f-ce0c-4547-bb8e-099dd0b0678a" providerId="ADAL" clId="{D52F279A-7EF8-4C78-9FE3-07C474CD763D}" dt="2020-06-02T14:52:18.846" v="196" actId="1076"/>
+    <pc:chgData name="François Liesbeth" userId="3ca9ba9f-ce0c-4547-bb8e-099dd0b0678a" providerId="ADAL" clId="{4ABBA479-A061-440C-B629-7F3B53190977}"/>
+    <pc:docChg chg="modSld">
+      <pc:chgData name="François Liesbeth" userId="3ca9ba9f-ce0c-4547-bb8e-099dd0b0678a" providerId="ADAL" clId="{4ABBA479-A061-440C-B629-7F3B53190977}" dt="2020-12-17T14:11:04.459" v="51" actId="1076"/>
       <pc:docMkLst>
         <pc:docMk/>
       </pc:docMkLst>
-      <pc:sldChg chg="addSp delSp modSp">
-        <pc:chgData name="François Liesbeth" userId="3ca9ba9f-ce0c-4547-bb8e-099dd0b0678a" providerId="ADAL" clId="{D52F279A-7EF8-4C78-9FE3-07C474CD763D}" dt="2020-06-02T14:52:18.846" v="196" actId="1076"/>
+      <pc:sldChg chg="modSp">
+        <pc:chgData name="François Liesbeth" userId="3ca9ba9f-ce0c-4547-bb8e-099dd0b0678a" providerId="ADAL" clId="{4ABBA479-A061-440C-B629-7F3B53190977}" dt="2020-12-17T14:11:04.459" v="51" actId="1076"/>
         <pc:sldMkLst>
           <pc:docMk/>
           <pc:sldMk cId="1151589946" sldId="256"/>
         </pc:sldMkLst>
         <pc:spChg chg="mod">
-          <ac:chgData name="François Liesbeth" userId="3ca9ba9f-ce0c-4547-bb8e-099dd0b0678a" providerId="ADAL" clId="{D52F279A-7EF8-4C78-9FE3-07C474CD763D}" dt="2020-05-29T07:55:40.981" v="0" actId="164"/>
+          <ac:chgData name="François Liesbeth" userId="3ca9ba9f-ce0c-4547-bb8e-099dd0b0678a" providerId="ADAL" clId="{4ABBA479-A061-440C-B629-7F3B53190977}" dt="2020-12-17T14:11:04.459" v="51" actId="1076"/>
           <ac:spMkLst>
             <pc:docMk/>
             <pc:sldMk cId="1151589946" sldId="256"/>
-            <ac:spMk id="4" creationId="{AACF3AAE-89A0-4CDE-874C-2D20A4A0E6AD}"/>
+            <ac:spMk id="132" creationId="{86320ABC-F6B0-4431-AF9F-7869392EBF06}"/>
           </ac:spMkLst>
         </pc:spChg>
         <pc:spChg chg="mod">
-          <ac:chgData name="François Liesbeth" userId="3ca9ba9f-ce0c-4547-bb8e-099dd0b0678a" providerId="ADAL" clId="{D52F279A-7EF8-4C78-9FE3-07C474CD763D}" dt="2020-05-29T08:00:10.700" v="101" actId="1076"/>
-          <ac:spMkLst>
-            <pc:docMk/>
-            <pc:sldMk cId="1151589946" sldId="256"/>
-            <ac:spMk id="5" creationId="{3CFE0686-5AE3-4C26-BC01-54316E7A9311}"/>
-          </ac:spMkLst>
-        </pc:spChg>
-        <pc:spChg chg="mod">
-          <ac:chgData name="François Liesbeth" userId="3ca9ba9f-ce0c-4547-bb8e-099dd0b0678a" providerId="ADAL" clId="{D52F279A-7EF8-4C78-9FE3-07C474CD763D}" dt="2020-05-29T07:55:40.981" v="0" actId="164"/>
-          <ac:spMkLst>
-            <pc:docMk/>
-            <pc:sldMk cId="1151589946" sldId="256"/>
-            <ac:spMk id="6" creationId="{DF7B6C0E-A12C-47D2-9F85-E16BFB1A50B9}"/>
-          </ac:spMkLst>
-        </pc:spChg>
-        <pc:spChg chg="mod">
-          <ac:chgData name="François Liesbeth" userId="3ca9ba9f-ce0c-4547-bb8e-099dd0b0678a" providerId="ADAL" clId="{D52F279A-7EF8-4C78-9FE3-07C474CD763D}" dt="2020-05-29T08:00:29.639" v="109" actId="1076"/>
-          <ac:spMkLst>
-            <pc:docMk/>
-            <pc:sldMk cId="1151589946" sldId="256"/>
-            <ac:spMk id="7" creationId="{5AD50843-6761-4110-B1EF-DD64F468DE31}"/>
-          </ac:spMkLst>
-        </pc:spChg>
-        <pc:spChg chg="mod">
-          <ac:chgData name="François Liesbeth" userId="3ca9ba9f-ce0c-4547-bb8e-099dd0b0678a" providerId="ADAL" clId="{D52F279A-7EF8-4C78-9FE3-07C474CD763D}" dt="2020-05-29T07:59:58.318" v="97" actId="1076"/>
-          <ac:spMkLst>
-            <pc:docMk/>
-            <pc:sldMk cId="1151589946" sldId="256"/>
-            <ac:spMk id="8" creationId="{1AC1EADA-5212-43AE-AA71-B32F0B1864D5}"/>
-          </ac:spMkLst>
-        </pc:spChg>
-        <pc:spChg chg="mod">
-          <ac:chgData name="François Liesbeth" userId="3ca9ba9f-ce0c-4547-bb8e-099dd0b0678a" providerId="ADAL" clId="{D52F279A-7EF8-4C78-9FE3-07C474CD763D}" dt="2020-05-29T07:55:40.981" v="0" actId="164"/>
-          <ac:spMkLst>
-            <pc:docMk/>
-            <pc:sldMk cId="1151589946" sldId="256"/>
-            <ac:spMk id="9" creationId="{9B844E9C-490E-4D3F-BD10-D46649FB80B3}"/>
-          </ac:spMkLst>
-        </pc:spChg>
-        <pc:spChg chg="mod">
-          <ac:chgData name="François Liesbeth" userId="3ca9ba9f-ce0c-4547-bb8e-099dd0b0678a" providerId="ADAL" clId="{D52F279A-7EF8-4C78-9FE3-07C474CD763D}" dt="2020-05-29T08:00:07.930" v="100" actId="1076"/>
-          <ac:spMkLst>
-            <pc:docMk/>
-            <pc:sldMk cId="1151589946" sldId="256"/>
-            <ac:spMk id="14" creationId="{D00BBAE0-5A5E-444D-93E0-560AB1807209}"/>
-          </ac:spMkLst>
-        </pc:spChg>
-        <pc:spChg chg="mod">
-          <ac:chgData name="François Liesbeth" userId="3ca9ba9f-ce0c-4547-bb8e-099dd0b0678a" providerId="ADAL" clId="{D52F279A-7EF8-4C78-9FE3-07C474CD763D}" dt="2020-05-29T08:00:04.819" v="99" actId="1076"/>
-          <ac:spMkLst>
-            <pc:docMk/>
-            <pc:sldMk cId="1151589946" sldId="256"/>
-            <ac:spMk id="30" creationId="{3C044324-16AA-41EA-95CB-822578AB6DBE}"/>
-          </ac:spMkLst>
-        </pc:spChg>
-        <pc:spChg chg="mod">
-          <ac:chgData name="François Liesbeth" userId="3ca9ba9f-ce0c-4547-bb8e-099dd0b0678a" providerId="ADAL" clId="{D52F279A-7EF8-4C78-9FE3-07C474CD763D}" dt="2020-05-29T07:55:40.981" v="0" actId="164"/>
-          <ac:spMkLst>
-            <pc:docMk/>
-            <pc:sldMk cId="1151589946" sldId="256"/>
-            <ac:spMk id="35" creationId="{842FBFB4-B21C-46D0-AC8B-C4E327516120}"/>
-          </ac:spMkLst>
-        </pc:spChg>
-        <pc:spChg chg="mod">
-          <ac:chgData name="François Liesbeth" userId="3ca9ba9f-ce0c-4547-bb8e-099dd0b0678a" providerId="ADAL" clId="{D52F279A-7EF8-4C78-9FE3-07C474CD763D}" dt="2020-05-29T07:55:40.981" v="0" actId="164"/>
-          <ac:spMkLst>
-            <pc:docMk/>
-            <pc:sldMk cId="1151589946" sldId="256"/>
-            <ac:spMk id="36" creationId="{92A7F14F-A2F9-4418-A0C2-CE89A08094E9}"/>
-          </ac:spMkLst>
-        </pc:spChg>
-        <pc:spChg chg="mod">
-          <ac:chgData name="François Liesbeth" userId="3ca9ba9f-ce0c-4547-bb8e-099dd0b0678a" providerId="ADAL" clId="{D52F279A-7EF8-4C78-9FE3-07C474CD763D}" dt="2020-05-29T07:55:40.981" v="0" actId="164"/>
-          <ac:spMkLst>
-            <pc:docMk/>
-            <pc:sldMk cId="1151589946" sldId="256"/>
-            <ac:spMk id="37" creationId="{B2B82D4F-2632-4B01-977B-A8E5253C9E88}"/>
-          </ac:spMkLst>
-        </pc:spChg>
-        <pc:spChg chg="mod">
-          <ac:chgData name="François Liesbeth" userId="3ca9ba9f-ce0c-4547-bb8e-099dd0b0678a" providerId="ADAL" clId="{D52F279A-7EF8-4C78-9FE3-07C474CD763D}" dt="2020-05-29T08:00:12.810" v="102" actId="1076"/>
-          <ac:spMkLst>
-            <pc:docMk/>
-            <pc:sldMk cId="1151589946" sldId="256"/>
-            <ac:spMk id="55" creationId="{3323636F-8D7D-4135-93F0-85077E3A9623}"/>
-          </ac:spMkLst>
-        </pc:spChg>
-        <pc:spChg chg="mod">
-          <ac:chgData name="François Liesbeth" userId="3ca9ba9f-ce0c-4547-bb8e-099dd0b0678a" providerId="ADAL" clId="{D52F279A-7EF8-4C78-9FE3-07C474CD763D}" dt="2020-05-29T08:00:19.428" v="104" actId="1076"/>
-          <ac:spMkLst>
-            <pc:docMk/>
-            <pc:sldMk cId="1151589946" sldId="256"/>
-            <ac:spMk id="56" creationId="{0A4CBE21-D894-48C8-86ED-98F1EAF547E5}"/>
-          </ac:spMkLst>
-        </pc:spChg>
-        <pc:spChg chg="add mod">
-          <ac:chgData name="François Liesbeth" userId="3ca9ba9f-ce0c-4547-bb8e-099dd0b0678a" providerId="ADAL" clId="{D52F279A-7EF8-4C78-9FE3-07C474CD763D}" dt="2020-05-29T08:00:41.115" v="112" actId="1076"/>
-          <ac:spMkLst>
-            <pc:docMk/>
-            <pc:sldMk cId="1151589946" sldId="256"/>
-            <ac:spMk id="58" creationId="{ADB117FF-3B3B-4F58-961D-53AD347DE9B5}"/>
-          </ac:spMkLst>
-        </pc:spChg>
-        <pc:spChg chg="add mod">
-          <ac:chgData name="François Liesbeth" userId="3ca9ba9f-ce0c-4547-bb8e-099dd0b0678a" providerId="ADAL" clId="{D52F279A-7EF8-4C78-9FE3-07C474CD763D}" dt="2020-05-29T08:00:34.406" v="111" actId="1076"/>
-          <ac:spMkLst>
-            <pc:docMk/>
-            <pc:sldMk cId="1151589946" sldId="256"/>
-            <ac:spMk id="59" creationId="{2A6AF045-D99C-4D6A-AD14-0C45ADB21F24}"/>
-          </ac:spMkLst>
-        </pc:spChg>
-        <pc:spChg chg="add mod">
-          <ac:chgData name="François Liesbeth" userId="3ca9ba9f-ce0c-4547-bb8e-099dd0b0678a" providerId="ADAL" clId="{D52F279A-7EF8-4C78-9FE3-07C474CD763D}" dt="2020-05-29T07:59:48.317" v="96" actId="164"/>
-          <ac:spMkLst>
-            <pc:docMk/>
-            <pc:sldMk cId="1151589946" sldId="256"/>
-            <ac:spMk id="60" creationId="{5FDCC58A-DD29-4A3B-AB8F-5F9047C8ECBA}"/>
-          </ac:spMkLst>
-        </pc:spChg>
-        <pc:spChg chg="add mod">
-          <ac:chgData name="François Liesbeth" userId="3ca9ba9f-ce0c-4547-bb8e-099dd0b0678a" providerId="ADAL" clId="{D52F279A-7EF8-4C78-9FE3-07C474CD763D}" dt="2020-05-29T07:59:48.317" v="96" actId="164"/>
-          <ac:spMkLst>
-            <pc:docMk/>
-            <pc:sldMk cId="1151589946" sldId="256"/>
-            <ac:spMk id="61" creationId="{55E7A155-A299-4F22-9F4D-AF44CF9937D5}"/>
-          </ac:spMkLst>
-        </pc:spChg>
-        <pc:spChg chg="add mod">
-          <ac:chgData name="François Liesbeth" userId="3ca9ba9f-ce0c-4547-bb8e-099dd0b0678a" providerId="ADAL" clId="{D52F279A-7EF8-4C78-9FE3-07C474CD763D}" dt="2020-05-29T08:00:02.780" v="98" actId="1076"/>
-          <ac:spMkLst>
-            <pc:docMk/>
-            <pc:sldMk cId="1151589946" sldId="256"/>
-            <ac:spMk id="62" creationId="{C7B44C5B-A2FB-47DE-9B60-6E0084C13CB2}"/>
-          </ac:spMkLst>
-        </pc:spChg>
-        <pc:spChg chg="add mod">
-          <ac:chgData name="François Liesbeth" userId="3ca9ba9f-ce0c-4547-bb8e-099dd0b0678a" providerId="ADAL" clId="{D52F279A-7EF8-4C78-9FE3-07C474CD763D}" dt="2020-05-29T07:59:48.317" v="96" actId="164"/>
-          <ac:spMkLst>
-            <pc:docMk/>
-            <pc:sldMk cId="1151589946" sldId="256"/>
-            <ac:spMk id="63" creationId="{B32196CB-18B4-4EEA-8D84-512604121092}"/>
-          </ac:spMkLst>
-        </pc:spChg>
-        <pc:spChg chg="add mod">
-          <ac:chgData name="François Liesbeth" userId="3ca9ba9f-ce0c-4547-bb8e-099dd0b0678a" providerId="ADAL" clId="{D52F279A-7EF8-4C78-9FE3-07C474CD763D}" dt="2020-06-02T14:51:56.393" v="189" actId="1076"/>
-          <ac:spMkLst>
-            <pc:docMk/>
-            <pc:sldMk cId="1151589946" sldId="256"/>
-            <ac:spMk id="69" creationId="{37FF502B-EB95-4D17-8604-CB2DEC25E4D7}"/>
-          </ac:spMkLst>
-        </pc:spChg>
-        <pc:spChg chg="add mod">
-          <ac:chgData name="François Liesbeth" userId="3ca9ba9f-ce0c-4547-bb8e-099dd0b0678a" providerId="ADAL" clId="{D52F279A-7EF8-4C78-9FE3-07C474CD763D}" dt="2020-06-02T14:52:00.947" v="191" actId="1076"/>
-          <ac:spMkLst>
-            <pc:docMk/>
-            <pc:sldMk cId="1151589946" sldId="256"/>
-            <ac:spMk id="70" creationId="{F3983346-AD23-4F1B-A427-8CFD8D70CBC7}"/>
-          </ac:spMkLst>
-        </pc:spChg>
-        <pc:spChg chg="add mod">
-          <ac:chgData name="François Liesbeth" userId="3ca9ba9f-ce0c-4547-bb8e-099dd0b0678a" providerId="ADAL" clId="{D52F279A-7EF8-4C78-9FE3-07C474CD763D}" dt="2020-06-02T14:52:18.846" v="196" actId="1076"/>
-          <ac:spMkLst>
-            <pc:docMk/>
-            <pc:sldMk cId="1151589946" sldId="256"/>
-            <ac:spMk id="73" creationId="{8993624A-5A6B-44DC-80D9-0FE4A8FD02DD}"/>
-          </ac:spMkLst>
-        </pc:spChg>
-        <pc:spChg chg="mod">
-          <ac:chgData name="François Liesbeth" userId="3ca9ba9f-ce0c-4547-bb8e-099dd0b0678a" providerId="ADAL" clId="{D52F279A-7EF8-4C78-9FE3-07C474CD763D}" dt="2020-06-02T14:43:53.970" v="151" actId="1076"/>
+          <ac:chgData name="François Liesbeth" userId="3ca9ba9f-ce0c-4547-bb8e-099dd0b0678a" providerId="ADAL" clId="{4ABBA479-A061-440C-B629-7F3B53190977}" dt="2020-12-17T14:10:45.393" v="25" actId="20577"/>
           <ac:spMkLst>
             <pc:docMk/>
             <pc:sldMk cId="1151589946" sldId="256"/>
@@ -320,7 +152,7 @@
           </ac:spMkLst>
         </pc:spChg>
         <pc:spChg chg="mod">
-          <ac:chgData name="François Liesbeth" userId="3ca9ba9f-ce0c-4547-bb8e-099dd0b0678a" providerId="ADAL" clId="{D52F279A-7EF8-4C78-9FE3-07C474CD763D}" dt="2020-06-02T14:43:26.102" v="147" actId="1076"/>
+          <ac:chgData name="François Liesbeth" userId="3ca9ba9f-ce0c-4547-bb8e-099dd0b0678a" providerId="ADAL" clId="{4ABBA479-A061-440C-B629-7F3B53190977}" dt="2020-12-17T14:10:49.664" v="31" actId="20577"/>
           <ac:spMkLst>
             <pc:docMk/>
             <pc:sldMk cId="1151589946" sldId="256"/>
@@ -328,311 +160,26 @@
           </ac:spMkLst>
         </pc:spChg>
         <pc:spChg chg="mod">
-          <ac:chgData name="François Liesbeth" userId="3ca9ba9f-ce0c-4547-bb8e-099dd0b0678a" providerId="ADAL" clId="{D52F279A-7EF8-4C78-9FE3-07C474CD763D}" dt="2020-06-02T14:51:48.409" v="186" actId="1076"/>
+          <ac:chgData name="François Liesbeth" userId="3ca9ba9f-ce0c-4547-bb8e-099dd0b0678a" providerId="ADAL" clId="{4ABBA479-A061-440C-B629-7F3B53190977}" dt="2020-12-17T14:10:54.799" v="43" actId="20577"/>
           <ac:spMkLst>
             <pc:docMk/>
             <pc:sldMk cId="1151589946" sldId="256"/>
-            <ac:spMk id="142" creationId="{48229EB8-4D2C-4C2C-95C4-ACA62BFD0F4D}"/>
+            <ac:spMk id="135" creationId="{7052EC02-0AB3-4533-8BF5-100B1752A570}"/>
           </ac:spMkLst>
         </pc:spChg>
-        <pc:spChg chg="mod">
-          <ac:chgData name="François Liesbeth" userId="3ca9ba9f-ce0c-4547-bb8e-099dd0b0678a" providerId="ADAL" clId="{D52F279A-7EF8-4C78-9FE3-07C474CD763D}" dt="2020-06-02T14:51:32.865" v="183" actId="1076"/>
-          <ac:spMkLst>
-            <pc:docMk/>
-            <pc:sldMk cId="1151589946" sldId="256"/>
-            <ac:spMk id="150" creationId="{CDFB6250-87A7-42F6-B4A2-2D967468A29D}"/>
-          </ac:spMkLst>
-        </pc:spChg>
-        <pc:spChg chg="mod">
-          <ac:chgData name="François Liesbeth" userId="3ca9ba9f-ce0c-4547-bb8e-099dd0b0678a" providerId="ADAL" clId="{D52F279A-7EF8-4C78-9FE3-07C474CD763D}" dt="2020-06-02T14:51:53.160" v="187" actId="1076"/>
-          <ac:spMkLst>
-            <pc:docMk/>
-            <pc:sldMk cId="1151589946" sldId="256"/>
-            <ac:spMk id="152" creationId="{EDF33546-F971-4152-BB11-B7418A838ADD}"/>
-          </ac:spMkLst>
-        </pc:spChg>
-        <pc:spChg chg="mod">
-          <ac:chgData name="François Liesbeth" userId="3ca9ba9f-ce0c-4547-bb8e-099dd0b0678a" providerId="ADAL" clId="{D52F279A-7EF8-4C78-9FE3-07C474CD763D}" dt="2020-06-02T14:52:04.345" v="192" actId="1076"/>
-          <ac:spMkLst>
-            <pc:docMk/>
-            <pc:sldMk cId="1151589946" sldId="256"/>
-            <ac:spMk id="155" creationId="{D4CBD8D9-3DE1-4BFC-AC0C-6329CA7D8434}"/>
-          </ac:spMkLst>
-        </pc:spChg>
-        <pc:grpChg chg="add mod">
-          <ac:chgData name="François Liesbeth" userId="3ca9ba9f-ce0c-4547-bb8e-099dd0b0678a" providerId="ADAL" clId="{D52F279A-7EF8-4C78-9FE3-07C474CD763D}" dt="2020-05-29T07:59:48.317" v="96" actId="164"/>
-          <ac:grpSpMkLst>
-            <pc:docMk/>
-            <pc:sldMk cId="1151589946" sldId="256"/>
-            <ac:grpSpMk id="57" creationId="{62961D8C-51F0-4412-AC6F-6A6F8CE95211}"/>
-          </ac:grpSpMkLst>
-        </pc:grpChg>
-        <pc:grpChg chg="add del mod">
-          <ac:chgData name="François Liesbeth" userId="3ca9ba9f-ce0c-4547-bb8e-099dd0b0678a" providerId="ADAL" clId="{D52F279A-7EF8-4C78-9FE3-07C474CD763D}" dt="2020-05-29T08:02:35.143" v="119" actId="478"/>
-          <ac:grpSpMkLst>
-            <pc:docMk/>
-            <pc:sldMk cId="1151589946" sldId="256"/>
-            <ac:grpSpMk id="64" creationId="{D77BF2F9-7F2F-4603-9280-4A4687E149C4}"/>
-          </ac:grpSpMkLst>
-        </pc:grpChg>
-        <pc:grpChg chg="add del mod">
-          <ac:chgData name="François Liesbeth" userId="3ca9ba9f-ce0c-4547-bb8e-099dd0b0678a" providerId="ADAL" clId="{D52F279A-7EF8-4C78-9FE3-07C474CD763D}" dt="2020-05-29T08:02:57.503" v="123" actId="478"/>
-          <ac:grpSpMkLst>
-            <pc:docMk/>
-            <pc:sldMk cId="1151589946" sldId="256"/>
-            <ac:grpSpMk id="70" creationId="{51136144-68D0-4D22-9449-3CF3EA0609D2}"/>
-          </ac:grpSpMkLst>
-        </pc:grpChg>
-        <pc:grpChg chg="add del">
-          <ac:chgData name="François Liesbeth" userId="3ca9ba9f-ce0c-4547-bb8e-099dd0b0678a" providerId="ADAL" clId="{D52F279A-7EF8-4C78-9FE3-07C474CD763D}" dt="2020-05-29T08:02:55.673" v="122"/>
-          <ac:grpSpMkLst>
-            <pc:docMk/>
-            <pc:sldMk cId="1151589946" sldId="256"/>
-            <ac:grpSpMk id="99" creationId="{6813295D-3F02-4C5E-B8E4-A8BE45B20FA0}"/>
-          </ac:grpSpMkLst>
-        </pc:grpChg>
-        <pc:grpChg chg="add mod">
-          <ac:chgData name="François Liesbeth" userId="3ca9ba9f-ce0c-4547-bb8e-099dd0b0678a" providerId="ADAL" clId="{D52F279A-7EF8-4C78-9FE3-07C474CD763D}" dt="2020-06-02T14:43:02.183" v="142" actId="1076"/>
-          <ac:grpSpMkLst>
-            <pc:docMk/>
-            <pc:sldMk cId="1151589946" sldId="256"/>
-            <ac:grpSpMk id="128" creationId="{AD4CA5E5-6E14-4DEF-A918-D148190BA4E5}"/>
-          </ac:grpSpMkLst>
-        </pc:grpChg>
         <pc:cxnChg chg="mod">
-          <ac:chgData name="François Liesbeth" userId="3ca9ba9f-ce0c-4547-bb8e-099dd0b0678a" providerId="ADAL" clId="{D52F279A-7EF8-4C78-9FE3-07C474CD763D}" dt="2020-05-29T08:02:35.143" v="119" actId="478"/>
-          <ac:cxnSpMkLst>
-            <pc:docMk/>
-            <pc:sldMk cId="1151589946" sldId="256"/>
-            <ac:cxnSpMk id="17" creationId="{7049CF98-5E5E-4391-9187-A4630C7EB865}"/>
-          </ac:cxnSpMkLst>
-        </pc:cxnChg>
-        <pc:cxnChg chg="mod">
-          <ac:chgData name="François Liesbeth" userId="3ca9ba9f-ce0c-4547-bb8e-099dd0b0678a" providerId="ADAL" clId="{D52F279A-7EF8-4C78-9FE3-07C474CD763D}" dt="2020-05-29T08:02:35.143" v="119" actId="478"/>
-          <ac:cxnSpMkLst>
-            <pc:docMk/>
-            <pc:sldMk cId="1151589946" sldId="256"/>
-            <ac:cxnSpMk id="19" creationId="{9F8E0585-05BE-4896-8EDD-7B02E76CF54C}"/>
-          </ac:cxnSpMkLst>
-        </pc:cxnChg>
-        <pc:cxnChg chg="mod">
-          <ac:chgData name="François Liesbeth" userId="3ca9ba9f-ce0c-4547-bb8e-099dd0b0678a" providerId="ADAL" clId="{D52F279A-7EF8-4C78-9FE3-07C474CD763D}" dt="2020-05-29T08:02:35.143" v="119" actId="478"/>
-          <ac:cxnSpMkLst>
-            <pc:docMk/>
-            <pc:sldMk cId="1151589946" sldId="256"/>
-            <ac:cxnSpMk id="22" creationId="{27032D26-C5D2-4704-9F90-A6C5687D8FC0}"/>
-          </ac:cxnSpMkLst>
-        </pc:cxnChg>
-        <pc:cxnChg chg="mod">
-          <ac:chgData name="François Liesbeth" userId="3ca9ba9f-ce0c-4547-bb8e-099dd0b0678a" providerId="ADAL" clId="{D52F279A-7EF8-4C78-9FE3-07C474CD763D}" dt="2020-05-29T08:02:35.143" v="119" actId="478"/>
-          <ac:cxnSpMkLst>
-            <pc:docMk/>
-            <pc:sldMk cId="1151589946" sldId="256"/>
-            <ac:cxnSpMk id="24" creationId="{5D678476-5E11-4396-98EE-9919CC487441}"/>
-          </ac:cxnSpMkLst>
-        </pc:cxnChg>
-        <pc:cxnChg chg="add del mod">
-          <ac:chgData name="François Liesbeth" userId="3ca9ba9f-ce0c-4547-bb8e-099dd0b0678a" providerId="ADAL" clId="{D52F279A-7EF8-4C78-9FE3-07C474CD763D}" dt="2020-06-02T14:50:26.699" v="166" actId="478"/>
-          <ac:cxnSpMkLst>
-            <pc:docMk/>
-            <pc:sldMk cId="1151589946" sldId="256"/>
-            <ac:cxnSpMk id="31" creationId="{ADA4705E-2415-42AE-B6F3-46B04E1BA615}"/>
-          </ac:cxnSpMkLst>
-        </pc:cxnChg>
-        <pc:cxnChg chg="mod">
-          <ac:chgData name="François Liesbeth" userId="3ca9ba9f-ce0c-4547-bb8e-099dd0b0678a" providerId="ADAL" clId="{D52F279A-7EF8-4C78-9FE3-07C474CD763D}" dt="2020-05-29T08:02:35.143" v="119" actId="478"/>
-          <ac:cxnSpMkLst>
-            <pc:docMk/>
-            <pc:sldMk cId="1151589946" sldId="256"/>
-            <ac:cxnSpMk id="32" creationId="{8DE18EDC-CD5A-4B4F-BBDB-E6C85A9AF599}"/>
-          </ac:cxnSpMkLst>
-        </pc:cxnChg>
-        <pc:cxnChg chg="add del mod">
-          <ac:chgData name="François Liesbeth" userId="3ca9ba9f-ce0c-4547-bb8e-099dd0b0678a" providerId="ADAL" clId="{D52F279A-7EF8-4C78-9FE3-07C474CD763D}" dt="2020-06-02T14:50:08.819" v="164" actId="478"/>
-          <ac:cxnSpMkLst>
-            <pc:docMk/>
-            <pc:sldMk cId="1151589946" sldId="256"/>
-            <ac:cxnSpMk id="34" creationId="{6ADFBCB6-7B05-492B-AD71-F0B28B71A754}"/>
-          </ac:cxnSpMkLst>
-        </pc:cxnChg>
-        <pc:cxnChg chg="mod">
-          <ac:chgData name="François Liesbeth" userId="3ca9ba9f-ce0c-4547-bb8e-099dd0b0678a" providerId="ADAL" clId="{D52F279A-7EF8-4C78-9FE3-07C474CD763D}" dt="2020-05-29T08:02:35.143" v="119" actId="478"/>
-          <ac:cxnSpMkLst>
-            <pc:docMk/>
-            <pc:sldMk cId="1151589946" sldId="256"/>
-            <ac:cxnSpMk id="34" creationId="{7E44F8DD-E565-4A94-A1A9-4C12FEC54606}"/>
-          </ac:cxnSpMkLst>
-        </pc:cxnChg>
-        <pc:cxnChg chg="add mod">
-          <ac:chgData name="François Liesbeth" userId="3ca9ba9f-ce0c-4547-bb8e-099dd0b0678a" providerId="ADAL" clId="{D52F279A-7EF8-4C78-9FE3-07C474CD763D}" dt="2020-06-02T14:43:02.183" v="142" actId="1076"/>
-          <ac:cxnSpMkLst>
-            <pc:docMk/>
-            <pc:sldMk cId="1151589946" sldId="256"/>
-            <ac:cxnSpMk id="37" creationId="{E35D676C-A3FF-4BBB-A78D-73A94C687F09}"/>
-          </ac:cxnSpMkLst>
-        </pc:cxnChg>
-        <pc:cxnChg chg="mod">
-          <ac:chgData name="François Liesbeth" userId="3ca9ba9f-ce0c-4547-bb8e-099dd0b0678a" providerId="ADAL" clId="{D52F279A-7EF8-4C78-9FE3-07C474CD763D}" dt="2020-05-29T08:02:35.143" v="119" actId="478"/>
-          <ac:cxnSpMkLst>
-            <pc:docMk/>
-            <pc:sldMk cId="1151589946" sldId="256"/>
-            <ac:cxnSpMk id="38" creationId="{84F13530-1FFA-4CD7-B2B2-89BECAF4725D}"/>
-          </ac:cxnSpMkLst>
-        </pc:cxnChg>
-        <pc:cxnChg chg="mod">
-          <ac:chgData name="François Liesbeth" userId="3ca9ba9f-ce0c-4547-bb8e-099dd0b0678a" providerId="ADAL" clId="{D52F279A-7EF8-4C78-9FE3-07C474CD763D}" dt="2020-05-29T08:02:35.143" v="119" actId="478"/>
-          <ac:cxnSpMkLst>
-            <pc:docMk/>
-            <pc:sldMk cId="1151589946" sldId="256"/>
-            <ac:cxnSpMk id="41" creationId="{CA318512-8247-4CCB-AD5C-60889DDF32CA}"/>
-          </ac:cxnSpMkLst>
-        </pc:cxnChg>
-        <pc:cxnChg chg="add mod">
-          <ac:chgData name="François Liesbeth" userId="3ca9ba9f-ce0c-4547-bb8e-099dd0b0678a" providerId="ADAL" clId="{D52F279A-7EF8-4C78-9FE3-07C474CD763D}" dt="2020-06-02T14:44:14.564" v="161" actId="14100"/>
-          <ac:cxnSpMkLst>
-            <pc:docMk/>
-            <pc:sldMk cId="1151589946" sldId="256"/>
-            <ac:cxnSpMk id="46" creationId="{38266B32-16EB-4B27-BE32-E3733A557C46}"/>
-          </ac:cxnSpMkLst>
-        </pc:cxnChg>
-        <pc:cxnChg chg="add mod">
-          <ac:chgData name="François Liesbeth" userId="3ca9ba9f-ce0c-4547-bb8e-099dd0b0678a" providerId="ADAL" clId="{D52F279A-7EF8-4C78-9FE3-07C474CD763D}" dt="2020-06-02T14:52:12.307" v="194" actId="14100"/>
-          <ac:cxnSpMkLst>
-            <pc:docMk/>
-            <pc:sldMk cId="1151589946" sldId="256"/>
-            <ac:cxnSpMk id="49" creationId="{4639B6C3-DA1E-410D-A65B-199F6EDFCBDF}"/>
-          </ac:cxnSpMkLst>
-        </pc:cxnChg>
-        <pc:cxnChg chg="add mod">
-          <ac:chgData name="François Liesbeth" userId="3ca9ba9f-ce0c-4547-bb8e-099dd0b0678a" providerId="ADAL" clId="{D52F279A-7EF8-4C78-9FE3-07C474CD763D}" dt="2020-06-02T14:50:49.551" v="173" actId="14100"/>
-          <ac:cxnSpMkLst>
-            <pc:docMk/>
-            <pc:sldMk cId="1151589946" sldId="256"/>
-            <ac:cxnSpMk id="55" creationId="{27540A8C-96DA-4FA6-8325-68A6E01426B1}"/>
-          </ac:cxnSpMkLst>
-        </pc:cxnChg>
-        <pc:cxnChg chg="add mod">
-          <ac:chgData name="François Liesbeth" userId="3ca9ba9f-ce0c-4547-bb8e-099dd0b0678a" providerId="ADAL" clId="{D52F279A-7EF8-4C78-9FE3-07C474CD763D}" dt="2020-06-02T14:51:02.847" v="177" actId="14100"/>
-          <ac:cxnSpMkLst>
-            <pc:docMk/>
-            <pc:sldMk cId="1151589946" sldId="256"/>
-            <ac:cxnSpMk id="60" creationId="{FFD485A1-6738-4255-B971-66FFADD8F7E8}"/>
-          </ac:cxnSpMkLst>
-        </pc:cxnChg>
-        <pc:cxnChg chg="mod">
-          <ac:chgData name="François Liesbeth" userId="3ca9ba9f-ce0c-4547-bb8e-099dd0b0678a" providerId="ADAL" clId="{D52F279A-7EF8-4C78-9FE3-07C474CD763D}" dt="2020-05-29T08:02:57.503" v="123" actId="478"/>
-          <ac:cxnSpMkLst>
-            <pc:docMk/>
-            <pc:sldMk cId="1151589946" sldId="256"/>
-            <ac:cxnSpMk id="85" creationId="{5AEFD841-A217-44A2-A793-A4C545D17BD0}"/>
-          </ac:cxnSpMkLst>
-        </pc:cxnChg>
-        <pc:cxnChg chg="mod">
-          <ac:chgData name="François Liesbeth" userId="3ca9ba9f-ce0c-4547-bb8e-099dd0b0678a" providerId="ADAL" clId="{D52F279A-7EF8-4C78-9FE3-07C474CD763D}" dt="2020-05-29T08:02:57.503" v="123" actId="478"/>
-          <ac:cxnSpMkLst>
-            <pc:docMk/>
-            <pc:sldMk cId="1151589946" sldId="256"/>
-            <ac:cxnSpMk id="86" creationId="{2664A2F6-5718-48BD-92D4-395FB436D3FE}"/>
-          </ac:cxnSpMkLst>
-        </pc:cxnChg>
-        <pc:cxnChg chg="mod">
-          <ac:chgData name="François Liesbeth" userId="3ca9ba9f-ce0c-4547-bb8e-099dd0b0678a" providerId="ADAL" clId="{D52F279A-7EF8-4C78-9FE3-07C474CD763D}" dt="2020-05-29T08:02:57.503" v="123" actId="478"/>
-          <ac:cxnSpMkLst>
-            <pc:docMk/>
-            <pc:sldMk cId="1151589946" sldId="256"/>
-            <ac:cxnSpMk id="87" creationId="{2AAF370F-1B7D-4FAF-AF23-83B9F2F77832}"/>
-          </ac:cxnSpMkLst>
-        </pc:cxnChg>
-        <pc:cxnChg chg="mod">
-          <ac:chgData name="François Liesbeth" userId="3ca9ba9f-ce0c-4547-bb8e-099dd0b0678a" providerId="ADAL" clId="{D52F279A-7EF8-4C78-9FE3-07C474CD763D}" dt="2020-05-29T08:02:57.503" v="123" actId="478"/>
-          <ac:cxnSpMkLst>
-            <pc:docMk/>
-            <pc:sldMk cId="1151589946" sldId="256"/>
-            <ac:cxnSpMk id="88" creationId="{65B28E2A-8030-4078-BBD9-FB05D9BB7783}"/>
-          </ac:cxnSpMkLst>
-        </pc:cxnChg>
-        <pc:cxnChg chg="mod">
-          <ac:chgData name="François Liesbeth" userId="3ca9ba9f-ce0c-4547-bb8e-099dd0b0678a" providerId="ADAL" clId="{D52F279A-7EF8-4C78-9FE3-07C474CD763D}" dt="2020-05-29T08:02:57.503" v="123" actId="478"/>
-          <ac:cxnSpMkLst>
-            <pc:docMk/>
-            <pc:sldMk cId="1151589946" sldId="256"/>
-            <ac:cxnSpMk id="90" creationId="{D5BC3B88-3299-464C-8B72-3097ACD0D5BD}"/>
-          </ac:cxnSpMkLst>
-        </pc:cxnChg>
-        <pc:cxnChg chg="mod">
-          <ac:chgData name="François Liesbeth" userId="3ca9ba9f-ce0c-4547-bb8e-099dd0b0678a" providerId="ADAL" clId="{D52F279A-7EF8-4C78-9FE3-07C474CD763D}" dt="2020-05-29T08:02:57.503" v="123" actId="478"/>
-          <ac:cxnSpMkLst>
-            <pc:docMk/>
-            <pc:sldMk cId="1151589946" sldId="256"/>
-            <ac:cxnSpMk id="91" creationId="{0A3045D3-24F1-4009-BE8D-5A8E1C591F72}"/>
-          </ac:cxnSpMkLst>
-        </pc:cxnChg>
-        <pc:cxnChg chg="mod">
-          <ac:chgData name="François Liesbeth" userId="3ca9ba9f-ce0c-4547-bb8e-099dd0b0678a" providerId="ADAL" clId="{D52F279A-7EF8-4C78-9FE3-07C474CD763D}" dt="2020-05-29T08:02:57.503" v="123" actId="478"/>
-          <ac:cxnSpMkLst>
-            <pc:docMk/>
-            <pc:sldMk cId="1151589946" sldId="256"/>
-            <ac:cxnSpMk id="95" creationId="{8D11BDF8-7F82-4F69-97BA-E3D954BE1093}"/>
-          </ac:cxnSpMkLst>
-        </pc:cxnChg>
-        <pc:cxnChg chg="mod">
-          <ac:chgData name="François Liesbeth" userId="3ca9ba9f-ce0c-4547-bb8e-099dd0b0678a" providerId="ADAL" clId="{D52F279A-7EF8-4C78-9FE3-07C474CD763D}" dt="2020-05-29T08:02:57.503" v="123" actId="478"/>
-          <ac:cxnSpMkLst>
-            <pc:docMk/>
-            <pc:sldMk cId="1151589946" sldId="256"/>
-            <ac:cxnSpMk id="96" creationId="{7B306384-1840-4E36-ADDF-8BB023DEA368}"/>
-          </ac:cxnSpMkLst>
-        </pc:cxnChg>
-        <pc:cxnChg chg="del mod">
-          <ac:chgData name="François Liesbeth" userId="3ca9ba9f-ce0c-4547-bb8e-099dd0b0678a" providerId="ADAL" clId="{D52F279A-7EF8-4C78-9FE3-07C474CD763D}" dt="2020-06-02T14:42:22.562" v="127" actId="478"/>
-          <ac:cxnSpMkLst>
-            <pc:docMk/>
-            <pc:sldMk cId="1151589946" sldId="256"/>
-            <ac:cxnSpMk id="144" creationId="{EBBE5172-19B5-4DE5-9543-C7B7137B0BA1}"/>
-          </ac:cxnSpMkLst>
-        </pc:cxnChg>
-        <pc:cxnChg chg="mod">
-          <ac:chgData name="François Liesbeth" userId="3ca9ba9f-ce0c-4547-bb8e-099dd0b0678a" providerId="ADAL" clId="{D52F279A-7EF8-4C78-9FE3-07C474CD763D}" dt="2020-06-02T14:51:43.529" v="185" actId="14100"/>
-          <ac:cxnSpMkLst>
-            <pc:docMk/>
-            <pc:sldMk cId="1151589946" sldId="256"/>
-            <ac:cxnSpMk id="146" creationId="{18125877-7B0E-4751-9D45-3F9743EB9B49}"/>
-          </ac:cxnSpMkLst>
-        </pc:cxnChg>
-        <pc:cxnChg chg="mod">
-          <ac:chgData name="François Liesbeth" userId="3ca9ba9f-ce0c-4547-bb8e-099dd0b0678a" providerId="ADAL" clId="{D52F279A-7EF8-4C78-9FE3-07C474CD763D}" dt="2020-06-02T14:51:28.207" v="182" actId="14100"/>
+          <ac:chgData name="François Liesbeth" userId="3ca9ba9f-ce0c-4547-bb8e-099dd0b0678a" providerId="ADAL" clId="{4ABBA479-A061-440C-B629-7F3B53190977}" dt="2020-12-17T14:10:45.393" v="25" actId="20577"/>
           <ac:cxnSpMkLst>
             <pc:docMk/>
             <pc:sldMk cId="1151589946" sldId="256"/>
             <ac:cxnSpMk id="148" creationId="{9AA3564B-8548-419C-80F4-28D71D870320}"/>
           </ac:cxnSpMkLst>
         </pc:cxnChg>
-        <pc:cxnChg chg="mod">
-          <ac:chgData name="François Liesbeth" userId="3ca9ba9f-ce0c-4547-bb8e-099dd0b0678a" providerId="ADAL" clId="{D52F279A-7EF8-4C78-9FE3-07C474CD763D}" dt="2020-06-02T14:51:19.238" v="180" actId="14100"/>
-          <ac:cxnSpMkLst>
-            <pc:docMk/>
-            <pc:sldMk cId="1151589946" sldId="256"/>
-            <ac:cxnSpMk id="149" creationId="{34290265-C97A-4AEC-B7CA-AD6AC751B582}"/>
-          </ac:cxnSpMkLst>
-        </pc:cxnChg>
-        <pc:cxnChg chg="del mod">
-          <ac:chgData name="François Liesbeth" userId="3ca9ba9f-ce0c-4547-bb8e-099dd0b0678a" providerId="ADAL" clId="{D52F279A-7EF8-4C78-9FE3-07C474CD763D}" dt="2020-06-02T14:42:37.398" v="132" actId="478"/>
-          <ac:cxnSpMkLst>
-            <pc:docMk/>
-            <pc:sldMk cId="1151589946" sldId="256"/>
-            <ac:cxnSpMk id="153" creationId="{A5BC375F-7B36-47BB-9708-A8AE43B55C7D}"/>
-          </ac:cxnSpMkLst>
-        </pc:cxnChg>
-        <pc:cxnChg chg="del mod">
-          <ac:chgData name="François Liesbeth" userId="3ca9ba9f-ce0c-4547-bb8e-099dd0b0678a" providerId="ADAL" clId="{D52F279A-7EF8-4C78-9FE3-07C474CD763D}" dt="2020-06-02T14:43:55.822" v="152" actId="478"/>
-          <ac:cxnSpMkLst>
-            <pc:docMk/>
-            <pc:sldMk cId="1151589946" sldId="256"/>
-            <ac:cxnSpMk id="154" creationId="{34020A3F-62CC-41D4-81D1-06418D9F1A1A}"/>
-          </ac:cxnSpMkLst>
-        </pc:cxnChg>
       </pc:sldChg>
     </pc:docChg>
+  </pc:docChgLst>
+  <pc:docChgLst>
+    <pc:chgData name="François Liesbeth" userId="3ca9ba9f-ce0c-4547-bb8e-099dd0b0678a" providerId="ADAL" clId="{D52F279A-7EF8-4C78-9FE3-07C474CD763D}"/>
   </pc:docChgLst>
 </pc:chgInfo>
 </file>
@@ -768,7 +315,7 @@
           <a:p>
             <a:fld id="{6654370B-1A64-4A30-93AE-94F20CA25A57}" type="datetimeFigureOut">
               <a:rPr lang="fr-BE" smtClean="0"/>
-              <a:t>02-06-20</a:t>
+              <a:t>17-12-20</a:t>
             </a:fld>
             <a:endParaRPr lang="fr-BE"/>
           </a:p>
@@ -938,7 +485,7 @@
           <a:p>
             <a:fld id="{6654370B-1A64-4A30-93AE-94F20CA25A57}" type="datetimeFigureOut">
               <a:rPr lang="fr-BE" smtClean="0"/>
-              <a:t>02-06-20</a:t>
+              <a:t>17-12-20</a:t>
             </a:fld>
             <a:endParaRPr lang="fr-BE"/>
           </a:p>
@@ -1118,7 +665,7 @@
           <a:p>
             <a:fld id="{6654370B-1A64-4A30-93AE-94F20CA25A57}" type="datetimeFigureOut">
               <a:rPr lang="fr-BE" smtClean="0"/>
-              <a:t>02-06-20</a:t>
+              <a:t>17-12-20</a:t>
             </a:fld>
             <a:endParaRPr lang="fr-BE"/>
           </a:p>
@@ -1288,7 +835,7 @@
           <a:p>
             <a:fld id="{6654370B-1A64-4A30-93AE-94F20CA25A57}" type="datetimeFigureOut">
               <a:rPr lang="fr-BE" smtClean="0"/>
-              <a:t>02-06-20</a:t>
+              <a:t>17-12-20</a:t>
             </a:fld>
             <a:endParaRPr lang="fr-BE"/>
           </a:p>
@@ -1534,7 +1081,7 @@
           <a:p>
             <a:fld id="{6654370B-1A64-4A30-93AE-94F20CA25A57}" type="datetimeFigureOut">
               <a:rPr lang="fr-BE" smtClean="0"/>
-              <a:t>02-06-20</a:t>
+              <a:t>17-12-20</a:t>
             </a:fld>
             <a:endParaRPr lang="fr-BE"/>
           </a:p>
@@ -1766,7 +1313,7 @@
           <a:p>
             <a:fld id="{6654370B-1A64-4A30-93AE-94F20CA25A57}" type="datetimeFigureOut">
               <a:rPr lang="fr-BE" smtClean="0"/>
-              <a:t>02-06-20</a:t>
+              <a:t>17-12-20</a:t>
             </a:fld>
             <a:endParaRPr lang="fr-BE"/>
           </a:p>
@@ -2133,7 +1680,7 @@
           <a:p>
             <a:fld id="{6654370B-1A64-4A30-93AE-94F20CA25A57}" type="datetimeFigureOut">
               <a:rPr lang="fr-BE" smtClean="0"/>
-              <a:t>02-06-20</a:t>
+              <a:t>17-12-20</a:t>
             </a:fld>
             <a:endParaRPr lang="fr-BE"/>
           </a:p>
@@ -2251,7 +1798,7 @@
           <a:p>
             <a:fld id="{6654370B-1A64-4A30-93AE-94F20CA25A57}" type="datetimeFigureOut">
               <a:rPr lang="fr-BE" smtClean="0"/>
-              <a:t>02-06-20</a:t>
+              <a:t>17-12-20</a:t>
             </a:fld>
             <a:endParaRPr lang="fr-BE"/>
           </a:p>
@@ -2346,7 +1893,7 @@
           <a:p>
             <a:fld id="{6654370B-1A64-4A30-93AE-94F20CA25A57}" type="datetimeFigureOut">
               <a:rPr lang="fr-BE" smtClean="0"/>
-              <a:t>02-06-20</a:t>
+              <a:t>17-12-20</a:t>
             </a:fld>
             <a:endParaRPr lang="fr-BE"/>
           </a:p>
@@ -2623,7 +2170,7 @@
           <a:p>
             <a:fld id="{6654370B-1A64-4A30-93AE-94F20CA25A57}" type="datetimeFigureOut">
               <a:rPr lang="fr-BE" smtClean="0"/>
-              <a:t>02-06-20</a:t>
+              <a:t>17-12-20</a:t>
             </a:fld>
             <a:endParaRPr lang="fr-BE"/>
           </a:p>
@@ -2880,7 +2427,7 @@
           <a:p>
             <a:fld id="{6654370B-1A64-4A30-93AE-94F20CA25A57}" type="datetimeFigureOut">
               <a:rPr lang="fr-BE" smtClean="0"/>
-              <a:t>02-06-20</a:t>
+              <a:t>17-12-20</a:t>
             </a:fld>
             <a:endParaRPr lang="fr-BE"/>
           </a:p>
@@ -3093,7 +2640,7 @@
           <a:p>
             <a:fld id="{6654370B-1A64-4A30-93AE-94F20CA25A57}" type="datetimeFigureOut">
               <a:rPr lang="fr-BE" smtClean="0"/>
-              <a:t>02-06-20</a:t>
+              <a:t>17-12-20</a:t>
             </a:fld>
             <a:endParaRPr lang="fr-BE"/>
           </a:p>
@@ -3513,9 +3060,9 @@
         <p:grpSpPr>
           <a:xfrm>
             <a:off x="340644" y="548576"/>
-            <a:ext cx="6487862" cy="2527394"/>
+            <a:ext cx="6447803" cy="2527394"/>
             <a:chOff x="1878032" y="512985"/>
-            <a:chExt cx="6487862" cy="2527394"/>
+            <a:chExt cx="6447803" cy="2527394"/>
           </a:xfrm>
         </p:grpSpPr>
         <p:grpSp>
@@ -4067,8 +3614,8 @@
             </p:nvCxnSpPr>
             <p:spPr>
               <a:xfrm>
-                <a:off x="6089253" y="1995864"/>
-                <a:ext cx="1566471" cy="563532"/>
+                <a:off x="6017117" y="1995864"/>
+                <a:ext cx="1638607" cy="563532"/>
               </a:xfrm>
               <a:prstGeom prst="straightConnector1">
                 <a:avLst/>
@@ -4528,7 +4075,7 @@
           </p:nvSpPr>
           <p:spPr>
             <a:xfrm>
-              <a:off x="3562268" y="741541"/>
+              <a:off x="3543958" y="750663"/>
               <a:ext cx="552011" cy="276999"/>
             </a:xfrm>
             <a:prstGeom prst="rect">
@@ -4577,7 +4124,7 @@
           <p:spPr>
             <a:xfrm>
               <a:off x="5309872" y="1865059"/>
-              <a:ext cx="779381" cy="261610"/>
+              <a:ext cx="707245" cy="261610"/>
             </a:xfrm>
             <a:prstGeom prst="rect">
               <a:avLst/>
@@ -4592,23 +4139,23 @@
             <a:p>
               <a:r>
                 <a:rPr lang="fr-BE" sz="1100" dirty="0"/>
-                <a:t>M</a:t>
+                <a:t>O</a:t>
               </a:r>
               <a:r>
                 <a:rPr lang="en-BE" sz="1100" dirty="0"/>
-                <a:t>O</a:t>
+                <a:t>R</a:t>
               </a:r>
               <a:r>
                 <a:rPr lang="fr-BE" sz="1100" dirty="0"/>
-                <a:t>N</a:t>
+                <a:t>P</a:t>
               </a:r>
               <a:r>
                 <a:rPr lang="en-BE" sz="1100" dirty="0"/>
-                <a:t>D</a:t>
+                <a:t>H</a:t>
               </a:r>
               <a:r>
                 <a:rPr lang="fr-BE" sz="1100" dirty="0"/>
-                <a:t>O</a:t>
+                <a:t>A</a:t>
               </a:r>
               <a:r>
                 <a:rPr lang="en-BE" sz="1100" dirty="0"/>
@@ -4633,7 +4180,7 @@
           <p:spPr>
             <a:xfrm>
               <a:off x="3209641" y="2556421"/>
-              <a:ext cx="756938" cy="276999"/>
+              <a:ext cx="670376" cy="276999"/>
             </a:xfrm>
             <a:prstGeom prst="rect">
               <a:avLst/>
@@ -4647,8 +4194,20 @@
             <a:lstStyle/>
             <a:p>
               <a:r>
+                <a:rPr lang="fr-BE" sz="1200" dirty="0"/>
+                <a:t>G</a:t>
+              </a:r>
+              <a:r>
                 <a:rPr lang="en-BE" sz="1200" dirty="0"/>
-                <a:t>ORPHA:1</a:t>
+                <a:t>A</a:t>
+              </a:r>
+              <a:r>
+                <a:rPr lang="fr-BE" sz="1200" dirty="0"/>
+                <a:t>R</a:t>
+              </a:r>
+              <a:r>
+                <a:rPr lang="en-BE" sz="1200" dirty="0"/>
+                <a:t>D:1</a:t>
               </a:r>
               <a:endParaRPr lang="fr-BE" sz="1200" dirty="0"/>
             </a:p>
@@ -4669,7 +4228,7 @@
           <p:spPr>
             <a:xfrm>
               <a:off x="7608956" y="2561082"/>
-              <a:ext cx="756938" cy="276999"/>
+              <a:ext cx="670376" cy="276999"/>
             </a:xfrm>
             <a:prstGeom prst="rect">
               <a:avLst/>
@@ -4684,27 +4243,19 @@
             <a:p>
               <a:r>
                 <a:rPr lang="fr-BE" sz="1200" dirty="0"/>
-                <a:t>O</a:t>
+                <a:t>G</a:t>
               </a:r>
               <a:r>
                 <a:rPr lang="en-BE" sz="1200" dirty="0"/>
+                <a:t>A</a:t>
+              </a:r>
+              <a:r>
+                <a:rPr lang="fr-BE" sz="1200" dirty="0"/>
                 <a:t>R</a:t>
               </a:r>
               <a:r>
-                <a:rPr lang="fr-BE" sz="1200" dirty="0"/>
-                <a:t>P</a:t>
-              </a:r>
-              <a:r>
                 <a:rPr lang="en-BE" sz="1200" dirty="0"/>
-                <a:t>H</a:t>
-              </a:r>
-              <a:r>
-                <a:rPr lang="fr-BE" sz="1200" dirty="0"/>
-                <a:t>A</a:t>
-              </a:r>
-              <a:r>
-                <a:rPr lang="en-BE" sz="1200" dirty="0"/>
-                <a:t>:2</a:t>
+                <a:t>D:2</a:t>
               </a:r>
               <a:endParaRPr lang="fr-BE" sz="1200" dirty="0"/>
             </a:p>
@@ -5360,21 +4911,6 @@
 </file>
 
 <file path=customXml/item1.xml><?xml version="1.0" encoding="utf-8"?>
-<p:properties xmlns:p="http://schemas.microsoft.com/office/2006/metadata/properties" xmlns:xsi="http://www.w3.org/2001/XMLSchema-instance" xmlns:pc="http://schemas.microsoft.com/office/infopath/2007/PartnerControls">
-  <documentManagement/>
-</p:properties>
-</file>
-
-<file path=customXml/item2.xml><?xml version="1.0" encoding="utf-8"?>
-<?mso-contentType ?>
-<FormTemplates xmlns="http://schemas.microsoft.com/sharepoint/v3/contenttype/forms">
-  <Display>DocumentLibraryForm</Display>
-  <Edit>DocumentLibraryForm</Edit>
-  <New>DocumentLibraryForm</New>
-</FormTemplates>
-</file>
-
-<file path=customXml/item3.xml><?xml version="1.0" encoding="utf-8"?>
 <ct:contentTypeSchema xmlns:ct="http://schemas.microsoft.com/office/2006/metadata/contentType" xmlns:ma="http://schemas.microsoft.com/office/2006/metadata/properties/metaAttributes" ct:_="" ma:_="" ma:contentTypeName="Document" ma:contentTypeID="0x0101007E0944364BD102468948A45A8F8C4115" ma:contentTypeVersion="13" ma:contentTypeDescription="Create a new document." ma:contentTypeScope="" ma:versionID="930e15e4b46bc7e9e06264ad8e9ffd5d">
   <xsd:schema xmlns:xsd="http://www.w3.org/2001/XMLSchema" xmlns:xs="http://www.w3.org/2001/XMLSchema" xmlns:p="http://schemas.microsoft.com/office/2006/metadata/properties" xmlns:ns3="993ccfa7-7427-47b6-8e45-6e99719fb274" xmlns:ns4="c13751bf-2e61-4f3e-8aba-d7ae2540d3c1" targetNamespace="http://schemas.microsoft.com/office/2006/metadata/properties" ma:root="true" ma:fieldsID="b02d5a429c43aa7367975e3d573c20c2" ns3:_="" ns4:_="">
     <xsd:import namespace="993ccfa7-7427-47b6-8e45-6e99719fb274"/>
@@ -5597,32 +5133,22 @@
 </ct:contentTypeSchema>
 </file>
 
-<file path=customXml/itemProps1.xml><?xml version="1.0" encoding="utf-8"?>
-<ds:datastoreItem xmlns:ds="http://schemas.openxmlformats.org/officeDocument/2006/customXml" ds:itemID="{4A2476E1-3987-4C38-A0B6-3578BEDF47E3}">
-  <ds:schemaRefs>
-    <ds:schemaRef ds:uri="http://schemas.microsoft.com/office/2006/metadata/properties"/>
-    <ds:schemaRef ds:uri="993ccfa7-7427-47b6-8e45-6e99719fb274"/>
-    <ds:schemaRef ds:uri="http://purl.org/dc/terms/"/>
-    <ds:schemaRef ds:uri="c13751bf-2e61-4f3e-8aba-d7ae2540d3c1"/>
-    <ds:schemaRef ds:uri="http://schemas.microsoft.com/office/2006/documentManagement/types"/>
-    <ds:schemaRef ds:uri="http://schemas.microsoft.com/office/infopath/2007/PartnerControls"/>
-    <ds:schemaRef ds:uri="http://purl.org/dc/elements/1.1/"/>
-    <ds:schemaRef ds:uri="http://schemas.openxmlformats.org/package/2006/metadata/core-properties"/>
-    <ds:schemaRef ds:uri="http://www.w3.org/XML/1998/namespace"/>
-    <ds:schemaRef ds:uri="http://purl.org/dc/dcmitype/"/>
-  </ds:schemaRefs>
-</ds:datastoreItem>
+<file path=customXml/item2.xml><?xml version="1.0" encoding="utf-8"?>
+<?mso-contentType ?>
+<FormTemplates xmlns="http://schemas.microsoft.com/sharepoint/v3/contenttype/forms">
+  <Display>DocumentLibraryForm</Display>
+  <Edit>DocumentLibraryForm</Edit>
+  <New>DocumentLibraryForm</New>
+</FormTemplates>
 </file>
 
-<file path=customXml/itemProps2.xml><?xml version="1.0" encoding="utf-8"?>
-<ds:datastoreItem xmlns:ds="http://schemas.openxmlformats.org/officeDocument/2006/customXml" ds:itemID="{DAFDD346-0DA5-4F8D-9737-8161DF5787EB}">
-  <ds:schemaRefs>
-    <ds:schemaRef ds:uri="http://schemas.microsoft.com/sharepoint/v3/contenttype/forms"/>
-  </ds:schemaRefs>
-</ds:datastoreItem>
+<file path=customXml/item3.xml><?xml version="1.0" encoding="utf-8"?>
+<p:properties xmlns:p="http://schemas.microsoft.com/office/2006/metadata/properties" xmlns:xsi="http://www.w3.org/2001/XMLSchema-instance" xmlns:pc="http://schemas.microsoft.com/office/infopath/2007/PartnerControls">
+  <documentManagement/>
+</p:properties>
 </file>
 
-<file path=customXml/itemProps3.xml><?xml version="1.0" encoding="utf-8"?>
+<file path=customXml/itemProps1.xml><?xml version="1.0" encoding="utf-8"?>
 <ds:datastoreItem xmlns:ds="http://schemas.openxmlformats.org/officeDocument/2006/customXml" ds:itemID="{4B0EE960-C2A5-4AA7-B84E-A9AB2AB28B4D}">
   <ds:schemaRefs>
     <ds:schemaRef ds:uri="http://schemas.microsoft.com/office/2006/metadata/contentType"/>
@@ -5639,4 +5165,29 @@
     <ds:schemaRef ds:uri="http://schemas.microsoft.com/internal/obd"/>
   </ds:schemaRefs>
 </ds:datastoreItem>
+</file>
+
+<file path=customXml/itemProps2.xml><?xml version="1.0" encoding="utf-8"?>
+<ds:datastoreItem xmlns:ds="http://schemas.openxmlformats.org/officeDocument/2006/customXml" ds:itemID="{DAFDD346-0DA5-4F8D-9737-8161DF5787EB}">
+  <ds:schemaRefs>
+    <ds:schemaRef ds:uri="http://schemas.microsoft.com/sharepoint/v3/contenttype/forms"/>
+  </ds:schemaRefs>
+</ds:datastoreItem>
+</file>
+
+<file path=customXml/itemProps3.xml><?xml version="1.0" encoding="utf-8"?>
+<ds:datastoreItem xmlns:ds="http://schemas.openxmlformats.org/officeDocument/2006/customXml" ds:itemID="{4A2476E1-3987-4C38-A0B6-3578BEDF47E3}">
+  <ds:schemaRefs>
+    <ds:schemaRef ds:uri="993ccfa7-7427-47b6-8e45-6e99719fb274"/>
+    <ds:schemaRef ds:uri="http://purl.org/dc/terms/"/>
+    <ds:schemaRef ds:uri="c13751bf-2e61-4f3e-8aba-d7ae2540d3c1"/>
+    <ds:schemaRef ds:uri="http://schemas.microsoft.com/office/2006/documentManagement/types"/>
+    <ds:schemaRef ds:uri="http://schemas.microsoft.com/office/infopath/2007/PartnerControls"/>
+    <ds:schemaRef ds:uri="http://purl.org/dc/elements/1.1/"/>
+    <ds:schemaRef ds:uri="http://schemas.microsoft.com/office/2006/metadata/properties"/>
+    <ds:schemaRef ds:uri="http://schemas.openxmlformats.org/package/2006/metadata/core-properties"/>
+    <ds:schemaRef ds:uri="http://www.w3.org/XML/1998/namespace"/>
+    <ds:schemaRef ds:uri="http://purl.org/dc/dcmitype/"/>
+  </ds:schemaRefs>
+</ds:datastoreItem>
 </file>
</xml_diff>